<commit_message>
add experiment environment setup
</commit_message>
<xml_diff>
--- a/SDN/SDN入门之旅.pptx
+++ b/SDN/SDN入门之旅.pptx
@@ -118,7 +118,7 @@
   </p:defaultTextStyle>
   <p:extLst>
     <p:ext uri="{521415D9-36F7-43E2-AB2F-B90AF26B5E84}">
-      <p14:sectionLst xmlns="" xmlns:p14="http://schemas.microsoft.com/office/powerpoint/2010/main">
+      <p14:sectionLst xmlns:p14="http://schemas.microsoft.com/office/powerpoint/2010/main" xmlns="">
         <p14:section name="封面" id="{972EC65A-60A7-44FD-BCE6-5D48DACA9F5C}">
           <p14:sldIdLst>
             <p14:sldId id="292"/>
@@ -256,7 +256,7 @@
       </p14:sectionLst>
     </p:ext>
     <p:ext uri="{EFAFB233-063F-42B5-8137-9DF3F51BA10A}">
-      <p15:sldGuideLst xmlns="" xmlns:p15="http://schemas.microsoft.com/office/powerpoint/2012/main">
+      <p15:sldGuideLst xmlns:p15="http://schemas.microsoft.com/office/powerpoint/2012/main" xmlns="">
         <p15:guide id="1" orient="horz" pos="3748" userDrawn="1">
           <p15:clr>
             <a:srgbClr val="A4A3A4"/>
@@ -356,7 +356,7 @@
             <a:fld id="{DA0D49B4-D9C2-456E-8C06-A1E83D0C7B6A}" type="datetimeFigureOut">
               <a:rPr lang="zh-CN" altLang="en-US" smtClean="0"/>
               <a:pPr/>
-              <a:t>2018/7/3</a:t>
+              <a:t>2018/7/4</a:t>
             </a:fld>
             <a:endParaRPr lang="zh-CN" altLang="en-US"/>
           </a:p>
@@ -524,7 +524,7 @@
     </p:spTree>
     <p:extLst>
       <p:ext uri="{BB962C8B-B14F-4D97-AF65-F5344CB8AC3E}">
-        <p14:creationId xmlns="" xmlns:p14="http://schemas.microsoft.com/office/powerpoint/2010/main" val="3407794156"/>
+        <p14:creationId xmlns:p14="http://schemas.microsoft.com/office/powerpoint/2010/main" xmlns="" val="3407794156"/>
       </p:ext>
     </p:extLst>
   </p:cSld>
@@ -804,7 +804,7 @@
             <a:fld id="{530820CF-B880-4189-942D-D702A7CBA730}" type="datetimeFigureOut">
               <a:rPr lang="zh-CN" altLang="en-US" smtClean="0"/>
               <a:pPr/>
-              <a:t>2018/7/3</a:t>
+              <a:t>2018/7/4</a:t>
             </a:fld>
             <a:endParaRPr lang="zh-CN" altLang="en-US"/>
           </a:p>
@@ -859,7 +859,7 @@
     <a:masterClrMapping/>
   </p:clrMapOvr>
   <mc:AlternateContent xmlns:mc="http://schemas.openxmlformats.org/markup-compatibility/2006">
-    <mc:Choice xmlns="" xmlns:p14="http://schemas.microsoft.com/office/powerpoint/2010/main" Requires="p14">
+    <mc:Choice xmlns:p14="http://schemas.microsoft.com/office/powerpoint/2010/main" xmlns="" Requires="p14">
       <p:transition spd="slow" p14:dur="1500">
         <p:random/>
       </p:transition>
@@ -981,7 +981,7 @@
             <a:fld id="{530820CF-B880-4189-942D-D702A7CBA730}" type="datetimeFigureOut">
               <a:rPr lang="zh-CN" altLang="en-US" smtClean="0"/>
               <a:pPr/>
-              <a:t>2018/7/3</a:t>
+              <a:t>2018/7/4</a:t>
             </a:fld>
             <a:endParaRPr lang="zh-CN" altLang="en-US"/>
           </a:p>
@@ -1036,7 +1036,7 @@
     <a:masterClrMapping/>
   </p:clrMapOvr>
   <mc:AlternateContent xmlns:mc="http://schemas.openxmlformats.org/markup-compatibility/2006">
-    <mc:Choice xmlns="" xmlns:p14="http://schemas.microsoft.com/office/powerpoint/2010/main" Requires="p14">
+    <mc:Choice xmlns:p14="http://schemas.microsoft.com/office/powerpoint/2010/main" xmlns="" Requires="p14">
       <p:transition spd="slow" p14:dur="1500">
         <p:random/>
       </p:transition>
@@ -1168,7 +1168,7 @@
             <a:fld id="{530820CF-B880-4189-942D-D702A7CBA730}" type="datetimeFigureOut">
               <a:rPr lang="zh-CN" altLang="en-US" smtClean="0"/>
               <a:pPr/>
-              <a:t>2018/7/3</a:t>
+              <a:t>2018/7/4</a:t>
             </a:fld>
             <a:endParaRPr lang="zh-CN" altLang="en-US"/>
           </a:p>
@@ -1223,7 +1223,7 @@
     <a:masterClrMapping/>
   </p:clrMapOvr>
   <mc:AlternateContent xmlns:mc="http://schemas.openxmlformats.org/markup-compatibility/2006">
-    <mc:Choice xmlns="" xmlns:p14="http://schemas.microsoft.com/office/powerpoint/2010/main" Requires="p14">
+    <mc:Choice xmlns:p14="http://schemas.microsoft.com/office/powerpoint/2010/main" xmlns="" Requires="p14">
       <p:transition spd="slow" p14:dur="1500">
         <p:random/>
       </p:transition>
@@ -1272,7 +1272,7 @@
             <a:fld id="{68BCBD30-92A3-41D3-B856-2D8D66AD7106}" type="datetime1">
               <a:rPr lang="zh-CN" altLang="en-US" smtClean="0"/>
               <a:pPr/>
-              <a:t>2018/7/3</a:t>
+              <a:t>2018/7/4</a:t>
             </a:fld>
             <a:endParaRPr lang="zh-CN" altLang="en-US"/>
           </a:p>
@@ -1324,7 +1324,7 @@
     </p:spTree>
     <p:extLst>
       <p:ext uri="{BB962C8B-B14F-4D97-AF65-F5344CB8AC3E}">
-        <p14:creationId xmlns="" xmlns:p14="http://schemas.microsoft.com/office/powerpoint/2010/main" val="2039279208"/>
+        <p14:creationId xmlns:p14="http://schemas.microsoft.com/office/powerpoint/2010/main" xmlns="" val="2039279208"/>
       </p:ext>
     </p:extLst>
   </p:cSld>
@@ -1332,7 +1332,7 @@
     <a:masterClrMapping/>
   </p:clrMapOvr>
   <mc:AlternateContent xmlns:mc="http://schemas.openxmlformats.org/markup-compatibility/2006">
-    <mc:Choice xmlns="" xmlns:p14="http://schemas.microsoft.com/office/powerpoint/2010/main" Requires="p14">
+    <mc:Choice xmlns:p14="http://schemas.microsoft.com/office/powerpoint/2010/main" xmlns="" Requires="p14">
       <p:transition spd="slow" p14:dur="1500">
         <p:random/>
       </p:transition>
@@ -1381,7 +1381,7 @@
             <a:fld id="{7A3E1FB8-671C-42D5-8780-4A37A3F9ABBB}" type="datetime1">
               <a:rPr lang="zh-CN" altLang="en-US" smtClean="0"/>
               <a:pPr/>
-              <a:t>2018/7/3</a:t>
+              <a:t>2018/7/4</a:t>
             </a:fld>
             <a:endParaRPr lang="zh-CN" altLang="en-US"/>
           </a:p>
@@ -1691,7 +1691,7 @@
     </p:spTree>
     <p:extLst>
       <p:ext uri="{BB962C8B-B14F-4D97-AF65-F5344CB8AC3E}">
-        <p14:creationId xmlns="" xmlns:p14="http://schemas.microsoft.com/office/powerpoint/2010/main" val="1612432978"/>
+        <p14:creationId xmlns:p14="http://schemas.microsoft.com/office/powerpoint/2010/main" xmlns="" val="1612432978"/>
       </p:ext>
     </p:extLst>
   </p:cSld>
@@ -1699,7 +1699,7 @@
     <a:masterClrMapping/>
   </p:clrMapOvr>
   <mc:AlternateContent xmlns:mc="http://schemas.openxmlformats.org/markup-compatibility/2006">
-    <mc:Choice xmlns="" xmlns:p14="http://schemas.microsoft.com/office/powerpoint/2010/main" Requires="p14">
+    <mc:Choice xmlns:p14="http://schemas.microsoft.com/office/powerpoint/2010/main" xmlns="" Requires="p14">
       <p:transition spd="slow" p14:dur="1500">
         <p:random/>
       </p:transition>
@@ -1821,7 +1821,7 @@
             <a:fld id="{530820CF-B880-4189-942D-D702A7CBA730}" type="datetimeFigureOut">
               <a:rPr lang="zh-CN" altLang="en-US" smtClean="0"/>
               <a:pPr/>
-              <a:t>2018/7/3</a:t>
+              <a:t>2018/7/4</a:t>
             </a:fld>
             <a:endParaRPr lang="zh-CN" altLang="en-US"/>
           </a:p>
@@ -1876,7 +1876,7 @@
     <a:masterClrMapping/>
   </p:clrMapOvr>
   <mc:AlternateContent xmlns:mc="http://schemas.openxmlformats.org/markup-compatibility/2006">
-    <mc:Choice xmlns="" xmlns:p14="http://schemas.microsoft.com/office/powerpoint/2010/main" Requires="p14">
+    <mc:Choice xmlns:p14="http://schemas.microsoft.com/office/powerpoint/2010/main" xmlns="" Requires="p14">
       <p:transition spd="slow" p14:dur="1500">
         <p:random/>
       </p:transition>
@@ -2075,7 +2075,7 @@
             <a:fld id="{530820CF-B880-4189-942D-D702A7CBA730}" type="datetimeFigureOut">
               <a:rPr lang="zh-CN" altLang="en-US" smtClean="0"/>
               <a:pPr/>
-              <a:t>2018/7/3</a:t>
+              <a:t>2018/7/4</a:t>
             </a:fld>
             <a:endParaRPr lang="zh-CN" altLang="en-US"/>
           </a:p>
@@ -2130,7 +2130,7 @@
     <a:masterClrMapping/>
   </p:clrMapOvr>
   <mc:AlternateContent xmlns:mc="http://schemas.openxmlformats.org/markup-compatibility/2006">
-    <mc:Choice xmlns="" xmlns:p14="http://schemas.microsoft.com/office/powerpoint/2010/main" Requires="p14">
+    <mc:Choice xmlns:p14="http://schemas.microsoft.com/office/powerpoint/2010/main" xmlns="" Requires="p14">
       <p:transition spd="slow" p14:dur="1500">
         <p:random/>
       </p:transition>
@@ -2369,7 +2369,7 @@
             <a:fld id="{530820CF-B880-4189-942D-D702A7CBA730}" type="datetimeFigureOut">
               <a:rPr lang="zh-CN" altLang="en-US" smtClean="0"/>
               <a:pPr/>
-              <a:t>2018/7/3</a:t>
+              <a:t>2018/7/4</a:t>
             </a:fld>
             <a:endParaRPr lang="zh-CN" altLang="en-US"/>
           </a:p>
@@ -2424,7 +2424,7 @@
     <a:masterClrMapping/>
   </p:clrMapOvr>
   <mc:AlternateContent xmlns:mc="http://schemas.openxmlformats.org/markup-compatibility/2006">
-    <mc:Choice xmlns="" xmlns:p14="http://schemas.microsoft.com/office/powerpoint/2010/main" Requires="p14">
+    <mc:Choice xmlns:p14="http://schemas.microsoft.com/office/powerpoint/2010/main" xmlns="" Requires="p14">
       <p:transition spd="slow" p14:dur="1500">
         <p:random/>
       </p:transition>
@@ -2797,7 +2797,7 @@
             <a:fld id="{530820CF-B880-4189-942D-D702A7CBA730}" type="datetimeFigureOut">
               <a:rPr lang="zh-CN" altLang="en-US" smtClean="0"/>
               <a:pPr/>
-              <a:t>2018/7/3</a:t>
+              <a:t>2018/7/4</a:t>
             </a:fld>
             <a:endParaRPr lang="zh-CN" altLang="en-US"/>
           </a:p>
@@ -2852,7 +2852,7 @@
     <a:masterClrMapping/>
   </p:clrMapOvr>
   <mc:AlternateContent xmlns:mc="http://schemas.openxmlformats.org/markup-compatibility/2006">
-    <mc:Choice xmlns="" xmlns:p14="http://schemas.microsoft.com/office/powerpoint/2010/main" Requires="p14">
+    <mc:Choice xmlns:p14="http://schemas.microsoft.com/office/powerpoint/2010/main" xmlns="" Requires="p14">
       <p:transition spd="slow" p14:dur="1500">
         <p:random/>
       </p:transition>
@@ -2923,7 +2923,7 @@
             <a:fld id="{530820CF-B880-4189-942D-D702A7CBA730}" type="datetimeFigureOut">
               <a:rPr lang="zh-CN" altLang="en-US" smtClean="0"/>
               <a:pPr/>
-              <a:t>2018/7/3</a:t>
+              <a:t>2018/7/4</a:t>
             </a:fld>
             <a:endParaRPr lang="zh-CN" altLang="en-US"/>
           </a:p>
@@ -2978,7 +2978,7 @@
     <a:masterClrMapping/>
   </p:clrMapOvr>
   <mc:AlternateContent xmlns:mc="http://schemas.openxmlformats.org/markup-compatibility/2006">
-    <mc:Choice xmlns="" xmlns:p14="http://schemas.microsoft.com/office/powerpoint/2010/main" Requires="p14">
+    <mc:Choice xmlns:p14="http://schemas.microsoft.com/office/powerpoint/2010/main" xmlns="" Requires="p14">
       <p:transition spd="slow" p14:dur="1500">
         <p:random/>
       </p:transition>
@@ -3027,7 +3027,7 @@
             <a:fld id="{530820CF-B880-4189-942D-D702A7CBA730}" type="datetimeFigureOut">
               <a:rPr lang="zh-CN" altLang="en-US" smtClean="0"/>
               <a:pPr/>
-              <a:t>2018/7/3</a:t>
+              <a:t>2018/7/4</a:t>
             </a:fld>
             <a:endParaRPr lang="zh-CN" altLang="en-US"/>
           </a:p>
@@ -3082,7 +3082,7 @@
     <a:masterClrMapping/>
   </p:clrMapOvr>
   <mc:AlternateContent xmlns:mc="http://schemas.openxmlformats.org/markup-compatibility/2006">
-    <mc:Choice xmlns="" xmlns:p14="http://schemas.microsoft.com/office/powerpoint/2010/main" Requires="p14">
+    <mc:Choice xmlns:p14="http://schemas.microsoft.com/office/powerpoint/2010/main" xmlns="" Requires="p14">
       <p:transition spd="slow" p14:dur="1500">
         <p:random/>
       </p:transition>
@@ -3311,7 +3311,7 @@
             <a:fld id="{530820CF-B880-4189-942D-D702A7CBA730}" type="datetimeFigureOut">
               <a:rPr lang="zh-CN" altLang="en-US" smtClean="0"/>
               <a:pPr/>
-              <a:t>2018/7/3</a:t>
+              <a:t>2018/7/4</a:t>
             </a:fld>
             <a:endParaRPr lang="zh-CN" altLang="en-US"/>
           </a:p>
@@ -3366,7 +3366,7 @@
     <a:masterClrMapping/>
   </p:clrMapOvr>
   <mc:AlternateContent xmlns:mc="http://schemas.openxmlformats.org/markup-compatibility/2006">
-    <mc:Choice xmlns="" xmlns:p14="http://schemas.microsoft.com/office/powerpoint/2010/main" Requires="p14">
+    <mc:Choice xmlns:p14="http://schemas.microsoft.com/office/powerpoint/2010/main" xmlns="" Requires="p14">
       <p:transition spd="slow" p14:dur="1500">
         <p:random/>
       </p:transition>
@@ -3572,7 +3572,7 @@
             <a:fld id="{530820CF-B880-4189-942D-D702A7CBA730}" type="datetimeFigureOut">
               <a:rPr lang="zh-CN" altLang="en-US" smtClean="0"/>
               <a:pPr/>
-              <a:t>2018/7/3</a:t>
+              <a:t>2018/7/4</a:t>
             </a:fld>
             <a:endParaRPr lang="zh-CN" altLang="en-US"/>
           </a:p>
@@ -3627,7 +3627,7 @@
     <a:masterClrMapping/>
   </p:clrMapOvr>
   <mc:AlternateContent xmlns:mc="http://schemas.openxmlformats.org/markup-compatibility/2006">
-    <mc:Choice xmlns="" xmlns:p14="http://schemas.microsoft.com/office/powerpoint/2010/main" Requires="p14">
+    <mc:Choice xmlns:p14="http://schemas.microsoft.com/office/powerpoint/2010/main" xmlns="" Requires="p14">
       <p:transition spd="slow" p14:dur="1500">
         <p:random/>
       </p:transition>
@@ -3796,7 +3796,7 @@
             <a:fld id="{530820CF-B880-4189-942D-D702A7CBA730}" type="datetimeFigureOut">
               <a:rPr lang="zh-CN" altLang="en-US" smtClean="0"/>
               <a:pPr/>
-              <a:t>2018/7/3</a:t>
+              <a:t>2018/7/4</a:t>
             </a:fld>
             <a:endParaRPr lang="zh-CN" altLang="en-US" dirty="0"/>
           </a:p>
@@ -3902,7 +3902,7 @@
     <p:sldLayoutId id="2147483662" r:id="rId13"/>
   </p:sldLayoutIdLst>
   <mc:AlternateContent xmlns:mc="http://schemas.openxmlformats.org/markup-compatibility/2006">
-    <mc:Choice xmlns="" xmlns:p14="http://schemas.microsoft.com/office/powerpoint/2010/main" Requires="p14">
+    <mc:Choice xmlns:p14="http://schemas.microsoft.com/office/powerpoint/2010/main" xmlns="" Requires="p14">
       <p:transition spd="slow" p14:dur="1500">
         <p:random/>
       </p:transition>
@@ -4231,16 +4231,7 @@
                 </a:solidFill>
                 <a:ea typeface="微软雅黑" panose="020B0503020204020204" pitchFamily="34" charset="-122"/>
               </a:rPr>
-              <a:t>I</a:t>
-            </a:r>
-            <a:r>
-              <a:rPr lang="en-US" altLang="zh-CN" sz="5333" b="1" dirty="0" smtClean="0">
-                <a:solidFill>
-                  <a:srgbClr val="1C2B38"/>
-                </a:solidFill>
-                <a:ea typeface="微软雅黑" panose="020B0503020204020204" pitchFamily="34" charset="-122"/>
-              </a:rPr>
-              <a:t>ntroduction</a:t>
+              <a:t>Introduction</a:t>
             </a:r>
             <a:endParaRPr lang="zh-CN" altLang="en-US" sz="5333" b="1" dirty="0">
               <a:solidFill>
@@ -4330,7 +4321,7 @@
     </p:spTree>
     <p:extLst>
       <p:ext uri="{BB962C8B-B14F-4D97-AF65-F5344CB8AC3E}">
-        <p14:creationId xmlns="" xmlns:p14="http://schemas.microsoft.com/office/powerpoint/2010/main" val="2059511690"/>
+        <p14:creationId xmlns:p14="http://schemas.microsoft.com/office/powerpoint/2010/main" xmlns="" val="2059511690"/>
       </p:ext>
     </p:extLst>
   </p:cSld>
@@ -4338,7 +4329,7 @@
     <a:masterClrMapping/>
   </p:clrMapOvr>
   <mc:AlternateContent xmlns:mc="http://schemas.openxmlformats.org/markup-compatibility/2006">
-    <mc:Choice xmlns="" xmlns:p14="http://schemas.microsoft.com/office/powerpoint/2010/main" Requires="p14">
+    <mc:Choice xmlns:p14="http://schemas.microsoft.com/office/powerpoint/2010/main" xmlns="" Requires="p14">
       <p:transition p14:dur="0"/>
     </mc:Choice>
     <mc:Fallback>
@@ -4551,11 +4542,7 @@
             </a:r>
             <a:r>
               <a:rPr lang="zh-CN" altLang="en-US" dirty="0" smtClean="0"/>
-              <a:t>官</a:t>
-            </a:r>
-            <a:r>
-              <a:rPr lang="zh-CN" altLang="en-US" dirty="0" smtClean="0"/>
-              <a:t>网</a:t>
+              <a:t>官网</a:t>
             </a:r>
             <a:r>
               <a:rPr lang="en-US" altLang="zh-CN" dirty="0" smtClean="0"/>
@@ -4567,13 +4554,7 @@
               <a:rPr lang="en-US" altLang="zh-CN" dirty="0" smtClean="0">
                 <a:hlinkClick r:id="rId2"/>
               </a:rPr>
-              <a:t>https://www.opennetworking.org</a:t>
-            </a:r>
-            <a:r>
-              <a:rPr lang="en-US" altLang="zh-CN" dirty="0" smtClean="0">
-                <a:hlinkClick r:id="rId2"/>
-              </a:rPr>
-              <a:t>/</a:t>
+              <a:t>https://www.opennetworking.org/</a:t>
             </a:r>
             <a:endParaRPr lang="en-US" altLang="zh-CN" dirty="0" smtClean="0"/>
           </a:p>
@@ -4616,11 +4597,7 @@
           <a:p>
             <a:r>
               <a:rPr lang="en-US" altLang="zh-CN" dirty="0" smtClean="0"/>
-              <a:t>SDN</a:t>
-            </a:r>
-            <a:r>
-              <a:rPr lang="en-US" altLang="zh-CN" dirty="0" smtClean="0"/>
-              <a:t>: Software Defined Networks </a:t>
+              <a:t>SDN: Software Defined Networks </a:t>
             </a:r>
             <a:r>
               <a:rPr lang="zh-CN" altLang="en-US" dirty="0" smtClean="0"/>
@@ -4644,22 +4621,13 @@
             </a:r>
             <a:r>
               <a:rPr lang="en-US" altLang="zh-CN" dirty="0" smtClean="0"/>
-              <a:t>, Ken </a:t>
-            </a:r>
-            <a:r>
-              <a:rPr lang="en-US" altLang="zh-CN" dirty="0" smtClean="0"/>
-              <a:t>Gray (Juniper Networks)</a:t>
-            </a:r>
-            <a:endParaRPr lang="en-US" altLang="zh-CN" dirty="0" smtClean="0"/>
+              <a:t>, Ken Gray (Juniper Networks)</a:t>
+            </a:r>
           </a:p>
           <a:p>
             <a:r>
               <a:rPr lang="zh-CN" altLang="en-US" dirty="0" smtClean="0"/>
-              <a:t>深度</a:t>
-            </a:r>
-            <a:r>
-              <a:rPr lang="zh-CN" altLang="en-US" dirty="0" smtClean="0"/>
-              <a:t>解析</a:t>
+              <a:t>深度解析</a:t>
             </a:r>
             <a:r>
               <a:rPr lang="en-US" altLang="zh-CN" dirty="0" smtClean="0"/>
@@ -4667,27 +4635,15 @@
             </a:r>
             <a:r>
               <a:rPr lang="zh-CN" altLang="en-US" dirty="0" smtClean="0"/>
-              <a:t>：利益、战略、技术、</a:t>
+              <a:t>：利益、战略、技术、实践</a:t>
+            </a:r>
+            <a:r>
+              <a:rPr lang="en-US" altLang="zh-CN" dirty="0" smtClean="0"/>
+              <a:t> -</a:t>
             </a:r>
             <a:r>
               <a:rPr lang="zh-CN" altLang="en-US" dirty="0" smtClean="0"/>
-              <a:t>实践</a:t>
-            </a:r>
-            <a:r>
-              <a:rPr lang="en-US" altLang="zh-CN" dirty="0" smtClean="0"/>
-              <a:t> </a:t>
-            </a:r>
-            <a:r>
-              <a:rPr lang="en-US" altLang="zh-CN" dirty="0" smtClean="0"/>
-              <a:t>-</a:t>
-            </a:r>
-            <a:r>
-              <a:rPr lang="zh-CN" altLang="en-US" dirty="0" smtClean="0"/>
-              <a:t> 张卫</a:t>
-            </a:r>
-            <a:r>
-              <a:rPr lang="zh-CN" altLang="en-US" dirty="0" smtClean="0"/>
-              <a:t>峰 </a:t>
+              <a:t> 张卫峰 </a:t>
             </a:r>
             <a:r>
               <a:rPr lang="en-US" altLang="zh-CN" dirty="0" smtClean="0"/>
@@ -4701,14 +4657,13 @@
               <a:rPr lang="en-US" altLang="zh-CN" dirty="0" smtClean="0"/>
               <a:t>)</a:t>
             </a:r>
-            <a:endParaRPr lang="en-US" altLang="zh-CN" dirty="0" smtClean="0"/>
           </a:p>
         </p:txBody>
       </p:sp>
     </p:spTree>
     <p:extLst>
       <p:ext uri="{BB962C8B-B14F-4D97-AF65-F5344CB8AC3E}">
-        <p14:creationId xmlns="" xmlns:p14="http://schemas.microsoft.com/office/powerpoint/2010/main" val="3221807754"/>
+        <p14:creationId xmlns:p14="http://schemas.microsoft.com/office/powerpoint/2010/main" xmlns="" val="3221807754"/>
       </p:ext>
     </p:extLst>
   </p:cSld>
@@ -4716,7 +4671,7 @@
     <a:masterClrMapping/>
   </p:clrMapOvr>
   <mc:AlternateContent xmlns:mc="http://schemas.openxmlformats.org/markup-compatibility/2006">
-    <mc:Choice xmlns="" xmlns:p14="http://schemas.microsoft.com/office/powerpoint/2010/main" Requires="p14">
+    <mc:Choice xmlns:p14="http://schemas.microsoft.com/office/powerpoint/2010/main" xmlns="" Requires="p14">
       <p:transition p14:dur="0"/>
     </mc:Choice>
     <mc:Fallback>
@@ -4857,7 +4812,7 @@
               </a:ln>
               <a:extLst>
                 <a:ext uri="{91240B29-F687-4F45-9708-019B960494DF}">
-                  <a14:hiddenLine xmlns="" xmlns:a14="http://schemas.microsoft.com/office/drawing/2010/main" w="9525">
+                  <a14:hiddenLine xmlns:a14="http://schemas.microsoft.com/office/drawing/2010/main" xmlns="" w="9525">
                     <a:solidFill>
                       <a:srgbClr val="000000"/>
                     </a:solidFill>
@@ -4906,7 +4861,7 @@
               </a:ln>
               <a:extLst>
                 <a:ext uri="{91240B29-F687-4F45-9708-019B960494DF}">
-                  <a14:hiddenLine xmlns="" xmlns:a14="http://schemas.microsoft.com/office/drawing/2010/main" w="9525">
+                  <a14:hiddenLine xmlns:a14="http://schemas.microsoft.com/office/drawing/2010/main" xmlns="" w="9525">
                     <a:solidFill>
                       <a:srgbClr val="000000"/>
                     </a:solidFill>
@@ -4955,7 +4910,7 @@
               </a:ln>
               <a:extLst>
                 <a:ext uri="{91240B29-F687-4F45-9708-019B960494DF}">
-                  <a14:hiddenLine xmlns="" xmlns:a14="http://schemas.microsoft.com/office/drawing/2010/main" w="9525">
+                  <a14:hiddenLine xmlns:a14="http://schemas.microsoft.com/office/drawing/2010/main" xmlns="" w="9525">
                     <a:solidFill>
                       <a:srgbClr val="000000"/>
                     </a:solidFill>
@@ -5004,7 +4959,7 @@
               </a:ln>
               <a:extLst>
                 <a:ext uri="{91240B29-F687-4F45-9708-019B960494DF}">
-                  <a14:hiddenLine xmlns="" xmlns:a14="http://schemas.microsoft.com/office/drawing/2010/main" w="9525">
+                  <a14:hiddenLine xmlns:a14="http://schemas.microsoft.com/office/drawing/2010/main" xmlns="" w="9525">
                     <a:solidFill>
                       <a:srgbClr val="000000"/>
                     </a:solidFill>
@@ -5053,7 +5008,7 @@
               </a:ln>
               <a:extLst>
                 <a:ext uri="{91240B29-F687-4F45-9708-019B960494DF}">
-                  <a14:hiddenLine xmlns="" xmlns:a14="http://schemas.microsoft.com/office/drawing/2010/main" w="9525">
+                  <a14:hiddenLine xmlns:a14="http://schemas.microsoft.com/office/drawing/2010/main" xmlns="" w="9525">
                     <a:solidFill>
                       <a:srgbClr val="000000"/>
                     </a:solidFill>
@@ -5102,7 +5057,7 @@
               </a:ln>
               <a:extLst>
                 <a:ext uri="{91240B29-F687-4F45-9708-019B960494DF}">
-                  <a14:hiddenLine xmlns="" xmlns:a14="http://schemas.microsoft.com/office/drawing/2010/main" w="9525">
+                  <a14:hiddenLine xmlns:a14="http://schemas.microsoft.com/office/drawing/2010/main" xmlns="" w="9525">
                     <a:solidFill>
                       <a:srgbClr val="000000"/>
                     </a:solidFill>
@@ -5168,7 +5123,7 @@
               </a:ln>
               <a:extLst>
                 <a:ext uri="{91240B29-F687-4F45-9708-019B960494DF}">
-                  <a14:hiddenLine xmlns="" xmlns:a14="http://schemas.microsoft.com/office/drawing/2010/main" w="9525">
+                  <a14:hiddenLine xmlns:a14="http://schemas.microsoft.com/office/drawing/2010/main" xmlns="" w="9525">
                     <a:solidFill>
                       <a:srgbClr val="000000"/>
                     </a:solidFill>
@@ -5217,7 +5172,7 @@
               </a:ln>
               <a:extLst>
                 <a:ext uri="{91240B29-F687-4F45-9708-019B960494DF}">
-                  <a14:hiddenLine xmlns="" xmlns:a14="http://schemas.microsoft.com/office/drawing/2010/main" w="9525">
+                  <a14:hiddenLine xmlns:a14="http://schemas.microsoft.com/office/drawing/2010/main" xmlns="" w="9525">
                     <a:solidFill>
                       <a:srgbClr val="000000"/>
                     </a:solidFill>
@@ -5266,7 +5221,7 @@
               </a:ln>
               <a:extLst>
                 <a:ext uri="{91240B29-F687-4F45-9708-019B960494DF}">
-                  <a14:hiddenLine xmlns="" xmlns:a14="http://schemas.microsoft.com/office/drawing/2010/main" w="9525">
+                  <a14:hiddenLine xmlns:a14="http://schemas.microsoft.com/office/drawing/2010/main" xmlns="" w="9525">
                     <a:solidFill>
                       <a:srgbClr val="000000"/>
                     </a:solidFill>
@@ -5315,7 +5270,7 @@
               </a:ln>
               <a:extLst>
                 <a:ext uri="{91240B29-F687-4F45-9708-019B960494DF}">
-                  <a14:hiddenLine xmlns="" xmlns:a14="http://schemas.microsoft.com/office/drawing/2010/main" w="9525">
+                  <a14:hiddenLine xmlns:a14="http://schemas.microsoft.com/office/drawing/2010/main" xmlns="" w="9525">
                     <a:solidFill>
                       <a:srgbClr val="000000"/>
                     </a:solidFill>
@@ -5364,7 +5319,7 @@
               </a:ln>
               <a:extLst>
                 <a:ext uri="{91240B29-F687-4F45-9708-019B960494DF}">
-                  <a14:hiddenLine xmlns="" xmlns:a14="http://schemas.microsoft.com/office/drawing/2010/main" w="9525">
+                  <a14:hiddenLine xmlns:a14="http://schemas.microsoft.com/office/drawing/2010/main" xmlns="" w="9525">
                     <a:solidFill>
                       <a:srgbClr val="000000"/>
                     </a:solidFill>
@@ -5413,7 +5368,7 @@
               </a:ln>
               <a:extLst>
                 <a:ext uri="{91240B29-F687-4F45-9708-019B960494DF}">
-                  <a14:hiddenLine xmlns="" xmlns:a14="http://schemas.microsoft.com/office/drawing/2010/main" w="9525">
+                  <a14:hiddenLine xmlns:a14="http://schemas.microsoft.com/office/drawing/2010/main" xmlns="" w="9525">
                     <a:solidFill>
                       <a:srgbClr val="000000"/>
                     </a:solidFill>
@@ -5502,17 +5457,7 @@
                 <a:latin typeface="微软雅黑" panose="020B0503020204020204" pitchFamily="34" charset="-122"/>
                 <a:ea typeface="微软雅黑" panose="020B0503020204020204" pitchFamily="34" charset="-122"/>
               </a:rPr>
-              <a:t> 的定义</a:t>
-            </a:r>
-            <a:r>
-              <a:rPr lang="zh-CN" altLang="en-US" sz="2400" dirty="0" smtClean="0">
-                <a:solidFill>
-                  <a:schemeClr val="bg1"/>
-                </a:solidFill>
-                <a:latin typeface="微软雅黑" panose="020B0503020204020204" pitchFamily="34" charset="-122"/>
-                <a:ea typeface="微软雅黑" panose="020B0503020204020204" pitchFamily="34" charset="-122"/>
-              </a:rPr>
-              <a:t>和架构</a:t>
+              <a:t> 的定义和架构</a:t>
             </a:r>
             <a:endParaRPr lang="en-US" altLang="zh-CN" sz="2400" dirty="0" smtClean="0">
               <a:solidFill>
@@ -5724,7 +5669,7 @@
                 <a:latin typeface="微软雅黑" panose="020B0503020204020204" pitchFamily="34" charset="-122"/>
                 <a:ea typeface="微软雅黑" panose="020B0503020204020204" pitchFamily="34" charset="-122"/>
               </a:rPr>
-              <a:t>动手实验</a:t>
+              <a:t>动手搭建</a:t>
             </a:r>
             <a:r>
               <a:rPr lang="en-US" altLang="zh-CN" sz="2400" dirty="0" smtClean="0">
@@ -5735,6 +5680,16 @@
                 <a:ea typeface="微软雅黑" panose="020B0503020204020204" pitchFamily="34" charset="-122"/>
               </a:rPr>
               <a:t>SDN</a:t>
+            </a:r>
+            <a:r>
+              <a:rPr lang="zh-CN" altLang="en-US" sz="2400" dirty="0" smtClean="0">
+                <a:solidFill>
+                  <a:schemeClr val="bg1"/>
+                </a:solidFill>
+                <a:latin typeface="微软雅黑" panose="020B0503020204020204" pitchFamily="34" charset="-122"/>
+                <a:ea typeface="微软雅黑" panose="020B0503020204020204" pitchFamily="34" charset="-122"/>
+              </a:rPr>
+              <a:t>实验环境</a:t>
             </a:r>
             <a:endParaRPr lang="en-US" altLang="zh-CN" sz="2400" dirty="0" smtClean="0">
               <a:solidFill>
@@ -5820,20 +5775,13 @@
               </a:rPr>
               <a:t> ODL</a:t>
             </a:r>
-            <a:endParaRPr lang="en-US" altLang="zh-CN" sz="2400" dirty="0" smtClean="0">
-              <a:solidFill>
-                <a:schemeClr val="bg1"/>
-              </a:solidFill>
-              <a:latin typeface="微软雅黑" panose="020B0503020204020204" pitchFamily="34" charset="-122"/>
-              <a:ea typeface="微软雅黑" panose="020B0503020204020204" pitchFamily="34" charset="-122"/>
-            </a:endParaRPr>
           </a:p>
         </p:txBody>
       </p:sp>
     </p:spTree>
     <p:extLst>
       <p:ext uri="{BB962C8B-B14F-4D97-AF65-F5344CB8AC3E}">
-        <p14:creationId xmlns="" xmlns:p14="http://schemas.microsoft.com/office/powerpoint/2010/main" val="3635060294"/>
+        <p14:creationId xmlns:p14="http://schemas.microsoft.com/office/powerpoint/2010/main" xmlns="" val="3635060294"/>
       </p:ext>
     </p:extLst>
   </p:cSld>
@@ -5841,7 +5789,7 @@
     <a:masterClrMapping/>
   </p:clrMapOvr>
   <mc:AlternateContent xmlns:mc="http://schemas.openxmlformats.org/markup-compatibility/2006">
-    <mc:Choice xmlns="" xmlns:p14="http://schemas.microsoft.com/office/powerpoint/2010/main" Requires="p14">
+    <mc:Choice xmlns:p14="http://schemas.microsoft.com/office/powerpoint/2010/main" xmlns="" Requires="p14">
       <p:transition p14:dur="0"/>
     </mc:Choice>
     <mc:Fallback>
@@ -6034,18 +5982,7 @@
                 <a:ea typeface="Arial Unicode MS" pitchFamily="34" charset="-122"/>
                 <a:cs typeface="Arial Unicode MS" pitchFamily="34" charset="-122"/>
               </a:rPr>
-              <a:t>的</a:t>
-            </a:r>
-            <a:r>
-              <a:rPr lang="zh-CN" altLang="en-US" sz="2667" b="1" dirty="0" smtClean="0">
-                <a:solidFill>
-                  <a:srgbClr val="FC611F"/>
-                </a:solidFill>
-                <a:latin typeface="Arial Unicode MS" pitchFamily="34" charset="-122"/>
-                <a:ea typeface="Arial Unicode MS" pitchFamily="34" charset="-122"/>
-                <a:cs typeface="Arial Unicode MS" pitchFamily="34" charset="-122"/>
-              </a:rPr>
-              <a:t>发展历史</a:t>
+              <a:t>的发展历史</a:t>
             </a:r>
             <a:endParaRPr lang="zh-CN" altLang="en-US" sz="2667" b="1" dirty="0">
               <a:solidFill>
@@ -6160,11 +6097,7 @@
             </a:r>
             <a:r>
               <a:rPr lang="zh-CN" altLang="en-US" sz="1200" dirty="0" smtClean="0"/>
-              <a:t>的核心思想就是控制与转发分离，将软件应用到网络控制中，并起到主导作用，而不是由固定模式的协议控制网络</a:t>
-            </a:r>
-            <a:r>
-              <a:rPr lang="zh-CN" altLang="en-US" sz="1200" dirty="0" smtClean="0"/>
-              <a:t>。</a:t>
+              <a:t>的核心思想就是控制与转发分离，将软件应用到网络控制中，并起到主导作用，而不是由固定模式的协议控制网络。</a:t>
             </a:r>
             <a:endParaRPr lang="en-US" altLang="zh-CN" sz="1200" dirty="0" smtClean="0"/>
           </a:p>
@@ -6175,15 +6108,7 @@
             </a:r>
             <a:r>
               <a:rPr lang="zh-CN" altLang="en-US" sz="1200" dirty="0" smtClean="0"/>
-              <a:t>的</a:t>
-            </a:r>
-            <a:r>
-              <a:rPr lang="zh-CN" altLang="en-US" sz="1200" dirty="0" smtClean="0"/>
-              <a:t>提出在</a:t>
-            </a:r>
-            <a:r>
-              <a:rPr lang="zh-CN" altLang="en-US" sz="1200" dirty="0" smtClean="0"/>
-              <a:t>业界引起了轩然大波，尤其是一直被网络设备商压制的网络用户，将其视为摆脱网络设备商牵制，翻身做主人的机会，于是</a:t>
+              <a:t>的提出在业界引起了轩然大波，尤其是一直被网络设备商压制的网络用户，将其视为摆脱网络设备商牵制，翻身做主人的机会，于是</a:t>
             </a:r>
             <a:r>
               <a:rPr lang="en-US" altLang="zh-CN" sz="1200" dirty="0" smtClean="0"/>
@@ -6199,11 +6124,7 @@
             </a:r>
             <a:r>
               <a:rPr lang="zh-CN" altLang="en-US" sz="1200" dirty="0" smtClean="0"/>
-              <a:t>就此诞生了</a:t>
-            </a:r>
-            <a:r>
-              <a:rPr lang="zh-CN" altLang="en-US" sz="1200" dirty="0" smtClean="0"/>
-              <a:t>。</a:t>
+              <a:t>就此诞生了。</a:t>
             </a:r>
             <a:endParaRPr lang="en-US" altLang="zh-CN" sz="1200" dirty="0" smtClean="0"/>
           </a:p>
@@ -6238,11 +6159,7 @@
             </a:r>
             <a:r>
               <a:rPr lang="zh-CN" altLang="en-US" sz="1200" dirty="0" smtClean="0"/>
-              <a:t>的工作重点是制定唯一的南向接口</a:t>
-            </a:r>
-            <a:r>
-              <a:rPr lang="zh-CN" altLang="en-US" sz="1200" dirty="0" smtClean="0"/>
-              <a:t>标准</a:t>
+              <a:t>的工作重点是制定唯一的南向接口标准</a:t>
             </a:r>
             <a:r>
               <a:rPr lang="en-US" altLang="zh-CN" sz="1200" dirty="0" err="1" smtClean="0"/>
@@ -6259,7 +6176,7 @@
     </p:spTree>
     <p:extLst>
       <p:ext uri="{BB962C8B-B14F-4D97-AF65-F5344CB8AC3E}">
-        <p14:creationId xmlns="" xmlns:p14="http://schemas.microsoft.com/office/powerpoint/2010/main" val="3767679558"/>
+        <p14:creationId xmlns:p14="http://schemas.microsoft.com/office/powerpoint/2010/main" xmlns="" val="3767679558"/>
       </p:ext>
     </p:extLst>
   </p:cSld>
@@ -6267,7 +6184,7 @@
     <a:masterClrMapping/>
   </p:clrMapOvr>
   <mc:AlternateContent xmlns:mc="http://schemas.openxmlformats.org/markup-compatibility/2006">
-    <mc:Choice xmlns="" xmlns:p14="http://schemas.microsoft.com/office/powerpoint/2010/main" Requires="p14">
+    <mc:Choice xmlns:p14="http://schemas.microsoft.com/office/powerpoint/2010/main" xmlns="" Requires="p14">
       <p:transition spd="slow" p14:dur="1200">
         <p14:prism/>
       </p:transition>
@@ -6464,29 +6381,7 @@
                 <a:ea typeface="Arial Unicode MS" pitchFamily="34" charset="-122"/>
                 <a:cs typeface="Arial Unicode MS" pitchFamily="34" charset="-122"/>
               </a:rPr>
-              <a:t>的</a:t>
-            </a:r>
-            <a:r>
-              <a:rPr lang="zh-CN" altLang="en-US" sz="2667" b="1" dirty="0" smtClean="0">
-                <a:solidFill>
-                  <a:srgbClr val="FC611F"/>
-                </a:solidFill>
-                <a:latin typeface="Arial Unicode MS" pitchFamily="34" charset="-122"/>
-                <a:ea typeface="Arial Unicode MS" pitchFamily="34" charset="-122"/>
-                <a:cs typeface="Arial Unicode MS" pitchFamily="34" charset="-122"/>
-              </a:rPr>
-              <a:t>发展</a:t>
-            </a:r>
-            <a:r>
-              <a:rPr lang="zh-CN" altLang="en-US" sz="2667" b="1" dirty="0" smtClean="0">
-                <a:solidFill>
-                  <a:srgbClr val="FC611F"/>
-                </a:solidFill>
-                <a:latin typeface="Arial Unicode MS" pitchFamily="34" charset="-122"/>
-                <a:ea typeface="Arial Unicode MS" pitchFamily="34" charset="-122"/>
-                <a:cs typeface="Arial Unicode MS" pitchFamily="34" charset="-122"/>
-              </a:rPr>
-              <a:t>历史 </a:t>
+              <a:t>的发展历史 </a:t>
             </a:r>
             <a:r>
               <a:rPr lang="en-US" altLang="zh-CN" sz="2667" b="1" dirty="0" smtClean="0">
@@ -6579,7 +6474,7 @@
     </p:spTree>
     <p:extLst>
       <p:ext uri="{BB962C8B-B14F-4D97-AF65-F5344CB8AC3E}">
-        <p14:creationId xmlns="" xmlns:p14="http://schemas.microsoft.com/office/powerpoint/2010/main" val="3767679558"/>
+        <p14:creationId xmlns:p14="http://schemas.microsoft.com/office/powerpoint/2010/main" xmlns="" val="3767679558"/>
       </p:ext>
     </p:extLst>
   </p:cSld>
@@ -6587,7 +6482,7 @@
     <a:masterClrMapping/>
   </p:clrMapOvr>
   <mc:AlternateContent xmlns:mc="http://schemas.openxmlformats.org/markup-compatibility/2006">
-    <mc:Choice xmlns="" xmlns:p14="http://schemas.microsoft.com/office/powerpoint/2010/main" Requires="p14">
+    <mc:Choice xmlns:p14="http://schemas.microsoft.com/office/powerpoint/2010/main" xmlns="" Requires="p14">
       <p:transition spd="slow" p14:dur="1200">
         <p14:prism/>
       </p:transition>
@@ -6821,19 +6716,7 @@
             </a:r>
             <a:r>
               <a:rPr lang="zh-CN" altLang="en-US" sz="1200" dirty="0" smtClean="0"/>
-              <a:t>从用户的角度制定协议，必然可以维护用户的利益，但是其间也出一些问题。</a:t>
-            </a:r>
-            <a:r>
-              <a:rPr lang="zh-CN" altLang="en-US" sz="1200" dirty="0" smtClean="0"/>
-              <a:t>网络</a:t>
-            </a:r>
-            <a:r>
-              <a:rPr lang="zh-CN" altLang="en-US" sz="1200" dirty="0" smtClean="0"/>
-              <a:t>设备的研发十分复杂，是一个系统化工程，需要结合方方面面考虑，需要丰富的实战经验，而这些正是网络用户所缺乏的，因此直接</a:t>
-            </a:r>
-            <a:r>
-              <a:rPr lang="zh-CN" altLang="en-US" sz="1200" dirty="0" smtClean="0"/>
-              <a:t>导致</a:t>
+              <a:t>从用户的角度制定协议，必然可以维护用户的利益，但是其间也出一些问题。网络设备的研发十分复杂，是一个系统化工程，需要结合方方面面考虑，需要丰富的实战经验，而这些正是网络用户所缺乏的，因此直接导致</a:t>
             </a:r>
             <a:r>
               <a:rPr lang="en-US" altLang="zh-CN" sz="1200" dirty="0" err="1" smtClean="0"/>
@@ -6841,15 +6724,7 @@
             </a:r>
             <a:r>
               <a:rPr lang="zh-CN" altLang="en-US" sz="1200" dirty="0" smtClean="0"/>
-              <a:t>协议过于理想化</a:t>
-            </a:r>
-            <a:r>
-              <a:rPr lang="zh-CN" altLang="en-US" sz="1200" dirty="0" smtClean="0"/>
-              <a:t>，无法</a:t>
-            </a:r>
-            <a:r>
-              <a:rPr lang="zh-CN" altLang="en-US" sz="1200" dirty="0" smtClean="0"/>
-              <a:t>实现大规模商用。这种情况下</a:t>
+              <a:t>协议过于理想化，无法实现大规模商用。这种情况下</a:t>
             </a:r>
             <a:r>
               <a:rPr lang="en-US" altLang="zh-CN" sz="1200" dirty="0" smtClean="0"/>
@@ -6905,11 +6780,7 @@
             </a:r>
             <a:r>
               <a:rPr lang="zh-CN" altLang="en-US" sz="1200" dirty="0" smtClean="0"/>
-              <a:t>中争得一席之地，才能为以后的发展留下生机</a:t>
-            </a:r>
-            <a:r>
-              <a:rPr lang="zh-CN" altLang="en-US" sz="1200" dirty="0" smtClean="0"/>
-              <a:t>。</a:t>
+              <a:t>中争得一席之地，才能为以后的发展留下生机。</a:t>
             </a:r>
             <a:endParaRPr lang="zh-CN" altLang="en-US" sz="1200" dirty="0"/>
           </a:p>
@@ -6951,7 +6822,7 @@
     </p:spTree>
     <p:extLst>
       <p:ext uri="{BB962C8B-B14F-4D97-AF65-F5344CB8AC3E}">
-        <p14:creationId xmlns="" xmlns:p14="http://schemas.microsoft.com/office/powerpoint/2010/main" val="3221807754"/>
+        <p14:creationId xmlns:p14="http://schemas.microsoft.com/office/powerpoint/2010/main" xmlns="" val="3221807754"/>
       </p:ext>
     </p:extLst>
   </p:cSld>
@@ -6959,7 +6830,7 @@
     <a:masterClrMapping/>
   </p:clrMapOvr>
   <mc:AlternateContent xmlns:mc="http://schemas.openxmlformats.org/markup-compatibility/2006">
-    <mc:Choice xmlns="" xmlns:p14="http://schemas.microsoft.com/office/powerpoint/2010/main" Requires="p14">
+    <mc:Choice xmlns:p14="http://schemas.microsoft.com/office/powerpoint/2010/main" xmlns="" Requires="p14">
       <p:transition p14:dur="0"/>
     </mc:Choice>
     <mc:Fallback>
@@ -7307,7 +7178,7 @@
     </p:spTree>
     <p:extLst>
       <p:ext uri="{BB962C8B-B14F-4D97-AF65-F5344CB8AC3E}">
-        <p14:creationId xmlns="" xmlns:p14="http://schemas.microsoft.com/office/powerpoint/2010/main" val="3221807754"/>
+        <p14:creationId xmlns:p14="http://schemas.microsoft.com/office/powerpoint/2010/main" xmlns="" val="3221807754"/>
       </p:ext>
     </p:extLst>
   </p:cSld>
@@ -7315,7 +7186,7 @@
     <a:masterClrMapping/>
   </p:clrMapOvr>
   <mc:AlternateContent xmlns:mc="http://schemas.openxmlformats.org/markup-compatibility/2006">
-    <mc:Choice xmlns="" xmlns:p14="http://schemas.microsoft.com/office/powerpoint/2010/main" Requires="p14">
+    <mc:Choice xmlns:p14="http://schemas.microsoft.com/office/powerpoint/2010/main" xmlns="" Requires="p14">
       <p:transition p14:dur="0"/>
     </mc:Choice>
     <mc:Fallback>
@@ -7672,7 +7543,7 @@
     </p:spTree>
     <p:extLst>
       <p:ext uri="{BB962C8B-B14F-4D97-AF65-F5344CB8AC3E}">
-        <p14:creationId xmlns="" xmlns:p14="http://schemas.microsoft.com/office/powerpoint/2010/main" val="3221807754"/>
+        <p14:creationId xmlns:p14="http://schemas.microsoft.com/office/powerpoint/2010/main" xmlns="" val="3221807754"/>
       </p:ext>
     </p:extLst>
   </p:cSld>
@@ -7680,7 +7551,7 @@
     <a:masterClrMapping/>
   </p:clrMapOvr>
   <mc:AlternateContent xmlns:mc="http://schemas.openxmlformats.org/markup-compatibility/2006">
-    <mc:Choice xmlns="" xmlns:p14="http://schemas.microsoft.com/office/powerpoint/2010/main" Requires="p14">
+    <mc:Choice xmlns:p14="http://schemas.microsoft.com/office/powerpoint/2010/main" xmlns="" Requires="p14">
       <p:transition p14:dur="0"/>
     </mc:Choice>
     <mc:Fallback>
@@ -7917,7 +7788,7 @@
     </p:spTree>
     <p:extLst>
       <p:ext uri="{BB962C8B-B14F-4D97-AF65-F5344CB8AC3E}">
-        <p14:creationId xmlns="" xmlns:p14="http://schemas.microsoft.com/office/powerpoint/2010/main" val="3620799539"/>
+        <p14:creationId xmlns:p14="http://schemas.microsoft.com/office/powerpoint/2010/main" xmlns="" val="3620799539"/>
       </p:ext>
     </p:extLst>
   </p:cSld>
@@ -7925,7 +7796,7 @@
     <a:masterClrMapping/>
   </p:clrMapOvr>
   <mc:AlternateContent xmlns:mc="http://schemas.openxmlformats.org/markup-compatibility/2006">
-    <mc:Choice xmlns="" xmlns:p14="http://schemas.microsoft.com/office/powerpoint/2010/main" Requires="p14">
+    <mc:Choice xmlns:p14="http://schemas.microsoft.com/office/powerpoint/2010/main" xmlns="" Requires="p14">
       <p:transition p14:dur="0"/>
     </mc:Choice>
     <mc:Fallback>
@@ -8077,7 +7948,7 @@
         <p:spPr>
           <a:xfrm>
             <a:off x="687690" y="440667"/>
-            <a:ext cx="3336607" cy="523220"/>
+            <a:ext cx="6265566" cy="523220"/>
           </a:xfrm>
           <a:prstGeom prst="rect">
             <a:avLst/>
@@ -8099,7 +7970,19 @@
             </a:r>
             <a:r>
               <a:rPr lang="zh-CN" altLang="en-US" sz="2800" dirty="0" smtClean="0"/>
-              <a:t>网络</a:t>
+              <a:t>实验网络 </a:t>
+            </a:r>
+            <a:r>
+              <a:rPr lang="en-US" altLang="zh-CN" sz="2800" dirty="0" smtClean="0"/>
+              <a:t>–</a:t>
+            </a:r>
+            <a:r>
+              <a:rPr lang="zh-CN" altLang="en-US" sz="2800" dirty="0" smtClean="0"/>
+              <a:t> 基于</a:t>
+            </a:r>
+            <a:r>
+              <a:rPr lang="en-US" altLang="zh-CN" sz="2800" dirty="0" err="1" smtClean="0"/>
+              <a:t>Mininet</a:t>
             </a:r>
             <a:endParaRPr lang="zh-CN" altLang="en-US" sz="2667" b="1" dirty="0">
               <a:solidFill>
@@ -8178,10 +8061,126 @@
           </a:p>
         </p:txBody>
       </p:sp>
+      <p:pic>
+        <p:nvPicPr>
+          <p:cNvPr id="1026" name="Picture 2"/>
+          <p:cNvPicPr>
+            <a:picLocks noChangeAspect="1" noChangeArrowheads="1"/>
+          </p:cNvPicPr>
+          <p:nvPr/>
+        </p:nvPicPr>
+        <p:blipFill>
+          <a:blip r:embed="rId2"/>
+          <a:srcRect/>
+          <a:stretch>
+            <a:fillRect/>
+          </a:stretch>
+        </p:blipFill>
+        <p:spPr bwMode="auto">
+          <a:xfrm>
+            <a:off x="452398" y="1857364"/>
+            <a:ext cx="4214842" cy="4857784"/>
+          </a:xfrm>
+          <a:prstGeom prst="rect">
+            <a:avLst/>
+          </a:prstGeom>
+          <a:noFill/>
+          <a:ln w="9525">
+            <a:noFill/>
+            <a:miter lim="800000"/>
+            <a:headEnd/>
+            <a:tailEnd/>
+          </a:ln>
+          <a:effectLst/>
+        </p:spPr>
+      </p:pic>
+      <p:sp>
+        <p:nvSpPr>
+          <p:cNvPr id="11" name="TextBox 10"/>
+          <p:cNvSpPr txBox="1"/>
+          <p:nvPr/>
+        </p:nvSpPr>
+        <p:spPr>
+          <a:xfrm>
+            <a:off x="5524496" y="1857364"/>
+            <a:ext cx="6357982" cy="1200329"/>
+          </a:xfrm>
+          <a:prstGeom prst="rect">
+            <a:avLst/>
+          </a:prstGeom>
+          <a:noFill/>
+        </p:spPr>
+        <p:txBody>
+          <a:bodyPr wrap="square" rtlCol="0">
+            <a:spAutoFit/>
+          </a:bodyPr>
+          <a:lstStyle/>
+          <a:p>
+            <a:r>
+              <a:rPr lang="zh-CN" altLang="en-US" dirty="0" smtClean="0"/>
+              <a:t>实验环境：</a:t>
+            </a:r>
+            <a:endParaRPr lang="en-US" altLang="zh-CN" dirty="0" smtClean="0"/>
+          </a:p>
+          <a:p>
+            <a:r>
+              <a:rPr lang="en-US" b="1" dirty="0" err="1" smtClean="0"/>
+              <a:t>ubuntu</a:t>
+            </a:r>
+            <a:r>
+              <a:rPr lang="en-US" b="1" dirty="0" smtClean="0"/>
+              <a:t>-releases/1</a:t>
+            </a:r>
+            <a:r>
+              <a:rPr lang="en-US" altLang="zh-CN" b="1" dirty="0" smtClean="0"/>
+              <a:t>6</a:t>
+            </a:r>
+            <a:r>
+              <a:rPr lang="en-US" b="1" dirty="0" smtClean="0"/>
+              <a:t>.04</a:t>
+            </a:r>
+            <a:r>
+              <a:rPr lang="zh-CN" altLang="en-US" b="1" dirty="0" smtClean="0"/>
+              <a:t>  </a:t>
+            </a:r>
+            <a:endParaRPr lang="en-US" altLang="zh-CN" b="1" dirty="0" smtClean="0"/>
+          </a:p>
+          <a:p>
+            <a:r>
+              <a:rPr lang="en-US" altLang="zh-CN" dirty="0" smtClean="0"/>
+              <a:t>(</a:t>
+            </a:r>
+            <a:r>
+              <a:rPr lang="zh-CN" altLang="en-US" dirty="0" smtClean="0"/>
+              <a:t>镜像下载</a:t>
+            </a:r>
+            <a:r>
+              <a:rPr lang="en-US" altLang="zh-CN" dirty="0" smtClean="0"/>
+              <a:t>http</a:t>
+            </a:r>
+            <a:r>
+              <a:rPr lang="en-US" altLang="zh-CN" smtClean="0"/>
+              <a:t>://</a:t>
+            </a:r>
+            <a:r>
+              <a:rPr lang="en-US" altLang="zh-CN" smtClean="0"/>
+              <a:t>mirrors.zju.edu.cn/ubuntu-releases/16.04</a:t>
+            </a:r>
+            <a:r>
+              <a:rPr lang="en-US" altLang="zh-CN" dirty="0" smtClean="0"/>
+              <a:t>/)</a:t>
+            </a:r>
+            <a:endParaRPr lang="en-US" dirty="0" smtClean="0"/>
+          </a:p>
+          <a:p>
+            <a:endParaRPr lang="zh-CN" altLang="en-US" dirty="0"/>
+          </a:p>
+        </p:txBody>
+      </p:sp>
     </p:spTree>
     <p:extLst>
       <p:ext uri="{BB962C8B-B14F-4D97-AF65-F5344CB8AC3E}">
-        <p14:creationId xmlns="" xmlns:p14="http://schemas.microsoft.com/office/powerpoint/2010/main" val="3620799539"/>
+        <p14:creationId xmlns:p14="http://schemas.microsoft.com/office/powerpoint/2010/main" xmlns="" val="3620799539"/>
       </p:ext>
     </p:extLst>
   </p:cSld>
@@ -8189,7 +8188,7 @@
     <a:masterClrMapping/>
   </p:clrMapOvr>
   <mc:AlternateContent xmlns:mc="http://schemas.openxmlformats.org/markup-compatibility/2006">
-    <mc:Choice xmlns="" xmlns:p14="http://schemas.microsoft.com/office/powerpoint/2010/main" Requires="p14">
+    <mc:Choice xmlns:p14="http://schemas.microsoft.com/office/powerpoint/2010/main" xmlns="" Requires="p14">
       <p:transition p14:dur="0"/>
     </mc:Choice>
     <mc:Fallback>
@@ -8778,7 +8777,7 @@
   <a:extraClrSchemeLst/>
   <a:extLst>
     <a:ext uri="{05A4C25C-085E-4340-85A3-A5531E510DB2}">
-      <thm15:themeFamily xmlns="" xmlns:thm15="http://schemas.microsoft.com/office/thememl/2012/main" name="Office Theme" id="{62F939B6-93AF-4DB8-9C6B-D6C7DFDC589F}" vid="{4A3C46E8-61CC-4603-A589-7422A47A8E4A}"/>
+      <thm15:themeFamily xmlns:thm15="http://schemas.microsoft.com/office/thememl/2012/main" xmlns="" name="Office Theme" id="{62F939B6-93AF-4DB8-9C6B-D6C7DFDC589F}" vid="{4A3C46E8-61CC-4603-A589-7422A47A8E4A}"/>
     </a:ext>
   </a:extLst>
 </a:theme>

</xml_diff>

<commit_message>
mininet 2.2.0 installation done in Ubuntu
</commit_message>
<xml_diff>
--- a/SDN/SDN入门之旅.pptx
+++ b/SDN/SDN入门之旅.pptx
@@ -356,7 +356,7 @@
             <a:fld id="{DA0D49B4-D9C2-456E-8C06-A1E83D0C7B6A}" type="datetimeFigureOut">
               <a:rPr lang="zh-CN" altLang="en-US" smtClean="0"/>
               <a:pPr/>
-              <a:t>2018/7/4</a:t>
+              <a:t>2018/7/5</a:t>
             </a:fld>
             <a:endParaRPr lang="zh-CN" altLang="en-US"/>
           </a:p>
@@ -804,7 +804,7 @@
             <a:fld id="{530820CF-B880-4189-942D-D702A7CBA730}" type="datetimeFigureOut">
               <a:rPr lang="zh-CN" altLang="en-US" smtClean="0"/>
               <a:pPr/>
-              <a:t>2018/7/4</a:t>
+              <a:t>2018/7/5</a:t>
             </a:fld>
             <a:endParaRPr lang="zh-CN" altLang="en-US"/>
           </a:p>
@@ -981,7 +981,7 @@
             <a:fld id="{530820CF-B880-4189-942D-D702A7CBA730}" type="datetimeFigureOut">
               <a:rPr lang="zh-CN" altLang="en-US" smtClean="0"/>
               <a:pPr/>
-              <a:t>2018/7/4</a:t>
+              <a:t>2018/7/5</a:t>
             </a:fld>
             <a:endParaRPr lang="zh-CN" altLang="en-US"/>
           </a:p>
@@ -1168,7 +1168,7 @@
             <a:fld id="{530820CF-B880-4189-942D-D702A7CBA730}" type="datetimeFigureOut">
               <a:rPr lang="zh-CN" altLang="en-US" smtClean="0"/>
               <a:pPr/>
-              <a:t>2018/7/4</a:t>
+              <a:t>2018/7/5</a:t>
             </a:fld>
             <a:endParaRPr lang="zh-CN" altLang="en-US"/>
           </a:p>
@@ -1272,7 +1272,7 @@
             <a:fld id="{68BCBD30-92A3-41D3-B856-2D8D66AD7106}" type="datetime1">
               <a:rPr lang="zh-CN" altLang="en-US" smtClean="0"/>
               <a:pPr/>
-              <a:t>2018/7/4</a:t>
+              <a:t>2018/7/5</a:t>
             </a:fld>
             <a:endParaRPr lang="zh-CN" altLang="en-US"/>
           </a:p>
@@ -1381,7 +1381,7 @@
             <a:fld id="{7A3E1FB8-671C-42D5-8780-4A37A3F9ABBB}" type="datetime1">
               <a:rPr lang="zh-CN" altLang="en-US" smtClean="0"/>
               <a:pPr/>
-              <a:t>2018/7/4</a:t>
+              <a:t>2018/7/5</a:t>
             </a:fld>
             <a:endParaRPr lang="zh-CN" altLang="en-US"/>
           </a:p>
@@ -1821,7 +1821,7 @@
             <a:fld id="{530820CF-B880-4189-942D-D702A7CBA730}" type="datetimeFigureOut">
               <a:rPr lang="zh-CN" altLang="en-US" smtClean="0"/>
               <a:pPr/>
-              <a:t>2018/7/4</a:t>
+              <a:t>2018/7/5</a:t>
             </a:fld>
             <a:endParaRPr lang="zh-CN" altLang="en-US"/>
           </a:p>
@@ -2075,7 +2075,7 @@
             <a:fld id="{530820CF-B880-4189-942D-D702A7CBA730}" type="datetimeFigureOut">
               <a:rPr lang="zh-CN" altLang="en-US" smtClean="0"/>
               <a:pPr/>
-              <a:t>2018/7/4</a:t>
+              <a:t>2018/7/5</a:t>
             </a:fld>
             <a:endParaRPr lang="zh-CN" altLang="en-US"/>
           </a:p>
@@ -2369,7 +2369,7 @@
             <a:fld id="{530820CF-B880-4189-942D-D702A7CBA730}" type="datetimeFigureOut">
               <a:rPr lang="zh-CN" altLang="en-US" smtClean="0"/>
               <a:pPr/>
-              <a:t>2018/7/4</a:t>
+              <a:t>2018/7/5</a:t>
             </a:fld>
             <a:endParaRPr lang="zh-CN" altLang="en-US"/>
           </a:p>
@@ -2797,7 +2797,7 @@
             <a:fld id="{530820CF-B880-4189-942D-D702A7CBA730}" type="datetimeFigureOut">
               <a:rPr lang="zh-CN" altLang="en-US" smtClean="0"/>
               <a:pPr/>
-              <a:t>2018/7/4</a:t>
+              <a:t>2018/7/5</a:t>
             </a:fld>
             <a:endParaRPr lang="zh-CN" altLang="en-US"/>
           </a:p>
@@ -2923,7 +2923,7 @@
             <a:fld id="{530820CF-B880-4189-942D-D702A7CBA730}" type="datetimeFigureOut">
               <a:rPr lang="zh-CN" altLang="en-US" smtClean="0"/>
               <a:pPr/>
-              <a:t>2018/7/4</a:t>
+              <a:t>2018/7/5</a:t>
             </a:fld>
             <a:endParaRPr lang="zh-CN" altLang="en-US"/>
           </a:p>
@@ -3027,7 +3027,7 @@
             <a:fld id="{530820CF-B880-4189-942D-D702A7CBA730}" type="datetimeFigureOut">
               <a:rPr lang="zh-CN" altLang="en-US" smtClean="0"/>
               <a:pPr/>
-              <a:t>2018/7/4</a:t>
+              <a:t>2018/7/5</a:t>
             </a:fld>
             <a:endParaRPr lang="zh-CN" altLang="en-US"/>
           </a:p>
@@ -3311,7 +3311,7 @@
             <a:fld id="{530820CF-B880-4189-942D-D702A7CBA730}" type="datetimeFigureOut">
               <a:rPr lang="zh-CN" altLang="en-US" smtClean="0"/>
               <a:pPr/>
-              <a:t>2018/7/4</a:t>
+              <a:t>2018/7/5</a:t>
             </a:fld>
             <a:endParaRPr lang="zh-CN" altLang="en-US"/>
           </a:p>
@@ -3572,7 +3572,7 @@
             <a:fld id="{530820CF-B880-4189-942D-D702A7CBA730}" type="datetimeFigureOut">
               <a:rPr lang="zh-CN" altLang="en-US" smtClean="0"/>
               <a:pPr/>
-              <a:t>2018/7/4</a:t>
+              <a:t>2018/7/5</a:t>
             </a:fld>
             <a:endParaRPr lang="zh-CN" altLang="en-US"/>
           </a:p>
@@ -3796,7 +3796,7 @@
             <a:fld id="{530820CF-B880-4189-942D-D702A7CBA730}" type="datetimeFigureOut">
               <a:rPr lang="zh-CN" altLang="en-US" smtClean="0"/>
               <a:pPr/>
-              <a:t>2018/7/4</a:t>
+              <a:t>2018/7/5</a:t>
             </a:fld>
             <a:endParaRPr lang="zh-CN" altLang="en-US" dirty="0"/>
           </a:p>
@@ -7978,7 +7978,7 @@
             </a:r>
             <a:r>
               <a:rPr lang="zh-CN" altLang="en-US" sz="2800" dirty="0" smtClean="0"/>
-              <a:t> 基于</a:t>
+              <a:t> </a:t>
             </a:r>
             <a:r>
               <a:rPr lang="en-US" altLang="zh-CN" sz="2800" dirty="0" err="1" smtClean="0"/>
@@ -8040,8 +8040,8 @@
         </p:nvSpPr>
         <p:spPr>
           <a:xfrm>
-            <a:off x="380960" y="1357298"/>
-            <a:ext cx="4061881" cy="369332"/>
+            <a:off x="380960" y="1071546"/>
+            <a:ext cx="6612259" cy="830997"/>
           </a:xfrm>
           <a:prstGeom prst="rect">
             <a:avLst/>
@@ -8054,23 +8054,152 @@
           <a:lstStyle/>
           <a:p>
             <a:r>
+              <a:rPr lang="en-US" sz="1200" dirty="0" err="1" smtClean="0"/>
+              <a:t>Mininet</a:t>
+            </a:r>
+            <a:r>
+              <a:rPr lang="en-US" sz="1200" dirty="0" smtClean="0"/>
+              <a:t> is a </a:t>
+            </a:r>
+            <a:r>
+              <a:rPr lang="en-US" sz="1200" i="1" dirty="0" smtClean="0"/>
+              <a:t>network emulator</a:t>
+            </a:r>
+            <a:r>
+              <a:rPr lang="en-US" sz="1200" dirty="0" smtClean="0"/>
+              <a:t> which creates a network of virtual hosts, switches, controllers, and links.</a:t>
+            </a:r>
+          </a:p>
+          <a:p>
+            <a:r>
+              <a:rPr lang="en-US" altLang="zh-CN" dirty="0" smtClean="0">
+                <a:hlinkClick r:id="rId2"/>
+              </a:rPr>
+              <a:t>https://github.com/mininet/mininet/wiki</a:t>
+            </a:r>
+            <a:endParaRPr lang="en-US" altLang="zh-CN" dirty="0" smtClean="0"/>
+          </a:p>
+          <a:p>
+            <a:endParaRPr lang="zh-CN" altLang="en-US" dirty="0"/>
+          </a:p>
+        </p:txBody>
+      </p:sp>
+      <p:sp>
+        <p:nvSpPr>
+          <p:cNvPr id="11" name="TextBox 10"/>
+          <p:cNvSpPr txBox="1"/>
+          <p:nvPr/>
+        </p:nvSpPr>
+        <p:spPr>
+          <a:xfrm>
+            <a:off x="452398" y="2000240"/>
+            <a:ext cx="6357982" cy="1292662"/>
+          </a:xfrm>
+          <a:prstGeom prst="rect">
+            <a:avLst/>
+          </a:prstGeom>
+          <a:noFill/>
+        </p:spPr>
+        <p:txBody>
+          <a:bodyPr wrap="square" rtlCol="0">
+            <a:spAutoFit/>
+          </a:bodyPr>
+          <a:lstStyle/>
+          <a:p>
+            <a:r>
+              <a:rPr lang="zh-CN" altLang="en-US" dirty="0" smtClean="0"/>
+              <a:t>实验环境</a:t>
+            </a:r>
+            <a:r>
               <a:rPr lang="en-US" altLang="zh-CN" dirty="0" smtClean="0"/>
-              <a:t>https://github.com/mininet/mininet/wiki</a:t>
-            </a:r>
+              <a:t>( </a:t>
+            </a:r>
+            <a:r>
+              <a:rPr lang="zh-CN" altLang="en-US" dirty="0" smtClean="0"/>
+              <a:t>使用源码安装</a:t>
+            </a:r>
+            <a:r>
+              <a:rPr lang="en-US" altLang="zh-CN" dirty="0" smtClean="0"/>
+              <a:t>)</a:t>
+            </a:r>
+            <a:r>
+              <a:rPr lang="zh-CN" altLang="en-US" dirty="0" smtClean="0"/>
+              <a:t>：</a:t>
+            </a:r>
+            <a:endParaRPr lang="en-US" altLang="zh-CN" dirty="0" smtClean="0"/>
+          </a:p>
+          <a:p>
+            <a:r>
+              <a:rPr lang="en-US" altLang="zh-CN" sz="1400" dirty="0" smtClean="0"/>
+              <a:t>1.</a:t>
+            </a:r>
+            <a:r>
+              <a:rPr lang="zh-CN" altLang="en-US" sz="1400" dirty="0" smtClean="0"/>
+              <a:t> 虚拟机上安装</a:t>
+            </a:r>
+            <a:r>
+              <a:rPr lang="en-US" altLang="zh-CN" sz="1400" dirty="0" err="1" smtClean="0"/>
+              <a:t>ubuntu</a:t>
+            </a:r>
+            <a:r>
+              <a:rPr lang="en-US" altLang="zh-CN" sz="1400" dirty="0" smtClean="0"/>
+              <a:t>(</a:t>
+            </a:r>
+            <a:r>
+              <a:rPr lang="zh-CN" altLang="en-US" sz="1400" dirty="0" smtClean="0"/>
+              <a:t>官方推荐</a:t>
+            </a:r>
+            <a:r>
+              <a:rPr lang="en-US" altLang="zh-CN" sz="1400" dirty="0" smtClean="0"/>
+              <a:t>)</a:t>
+            </a:r>
+          </a:p>
+          <a:p>
+            <a:r>
+              <a:rPr lang="en-US" altLang="zh-CN" sz="1400" dirty="0" smtClean="0"/>
+              <a:t>(</a:t>
+            </a:r>
+            <a:r>
+              <a:rPr lang="zh-CN" altLang="en-US" sz="1400" dirty="0" smtClean="0"/>
+              <a:t>镜像下载</a:t>
+            </a:r>
+            <a:r>
+              <a:rPr lang="en-US" altLang="zh-CN" sz="1400" dirty="0" smtClean="0">
+                <a:hlinkClick r:id="rId3"/>
+              </a:rPr>
+              <a:t>http://mirrors.zju.edu.cn/ubuntu-releases/14.04/</a:t>
+            </a:r>
+            <a:r>
+              <a:rPr lang="en-US" altLang="zh-CN" sz="1400" dirty="0" smtClean="0"/>
+              <a:t>)</a:t>
+            </a:r>
+          </a:p>
+          <a:p>
+            <a:r>
+              <a:rPr lang="en-US" altLang="zh-CN" sz="1400" dirty="0" smtClean="0"/>
+              <a:t>2. </a:t>
+            </a:r>
+            <a:r>
+              <a:rPr lang="zh-CN" altLang="en-US" sz="1400" dirty="0" smtClean="0"/>
+              <a:t>通过源码进行安装</a:t>
+            </a:r>
+            <a:endParaRPr lang="en-US" sz="1400" dirty="0" smtClean="0"/>
+          </a:p>
+          <a:p>
             <a:endParaRPr lang="zh-CN" altLang="en-US" dirty="0"/>
           </a:p>
         </p:txBody>
       </p:sp>
       <p:pic>
         <p:nvPicPr>
-          <p:cNvPr id="1026" name="Picture 2"/>
+          <p:cNvPr id="2" name="Picture 2"/>
           <p:cNvPicPr>
             <a:picLocks noChangeAspect="1" noChangeArrowheads="1"/>
           </p:cNvPicPr>
           <p:nvPr/>
         </p:nvPicPr>
         <p:blipFill>
-          <a:blip r:embed="rId2"/>
+          <a:blip r:embed="rId4"/>
           <a:srcRect/>
           <a:stretch>
             <a:fillRect/>
@@ -8078,8 +8207,8 @@
         </p:blipFill>
         <p:spPr bwMode="auto">
           <a:xfrm>
-            <a:off x="452398" y="1857364"/>
-            <a:ext cx="4214842" cy="4857784"/>
+            <a:off x="452398" y="5572140"/>
+            <a:ext cx="3954428" cy="1047747"/>
           </a:xfrm>
           <a:prstGeom prst="rect">
             <a:avLst/>
@@ -8094,89 +8223,72 @@
           <a:effectLst/>
         </p:spPr>
       </p:pic>
-      <p:sp>
-        <p:nvSpPr>
-          <p:cNvPr id="11" name="TextBox 10"/>
-          <p:cNvSpPr txBox="1"/>
+      <p:pic>
+        <p:nvPicPr>
+          <p:cNvPr id="4" name="Picture 2"/>
+          <p:cNvPicPr>
+            <a:picLocks noChangeAspect="1" noChangeArrowheads="1"/>
+          </p:cNvPicPr>
           <p:nvPr/>
-        </p:nvSpPr>
-        <p:spPr>
+        </p:nvPicPr>
+        <p:blipFill>
+          <a:blip r:embed="rId5"/>
+          <a:srcRect/>
+          <a:stretch>
+            <a:fillRect/>
+          </a:stretch>
+        </p:blipFill>
+        <p:spPr bwMode="auto">
           <a:xfrm>
-            <a:off x="5524496" y="1857364"/>
-            <a:ext cx="6357982" cy="1200329"/>
+            <a:off x="523836" y="3000372"/>
+            <a:ext cx="6572250" cy="209550"/>
           </a:xfrm>
           <a:prstGeom prst="rect">
             <a:avLst/>
           </a:prstGeom>
           <a:noFill/>
+          <a:ln w="9525">
+            <a:noFill/>
+            <a:miter lim="800000"/>
+            <a:headEnd/>
+            <a:tailEnd/>
+          </a:ln>
+          <a:effectLst/>
         </p:spPr>
-        <p:txBody>
-          <a:bodyPr wrap="square" rtlCol="0">
-            <a:spAutoFit/>
-          </a:bodyPr>
-          <a:lstStyle/>
-          <a:p>
-            <a:r>
-              <a:rPr lang="zh-CN" altLang="en-US" dirty="0" smtClean="0"/>
-              <a:t>实验环境：</a:t>
-            </a:r>
-            <a:endParaRPr lang="en-US" altLang="zh-CN" dirty="0" smtClean="0"/>
-          </a:p>
-          <a:p>
-            <a:r>
-              <a:rPr lang="en-US" b="1" dirty="0" err="1" smtClean="0"/>
-              <a:t>ubuntu</a:t>
-            </a:r>
-            <a:r>
-              <a:rPr lang="en-US" b="1" dirty="0" smtClean="0"/>
-              <a:t>-releases/1</a:t>
-            </a:r>
-            <a:r>
-              <a:rPr lang="en-US" altLang="zh-CN" b="1" dirty="0" smtClean="0"/>
-              <a:t>6</a:t>
-            </a:r>
-            <a:r>
-              <a:rPr lang="en-US" b="1" dirty="0" smtClean="0"/>
-              <a:t>.04</a:t>
-            </a:r>
-            <a:r>
-              <a:rPr lang="zh-CN" altLang="en-US" b="1" dirty="0" smtClean="0"/>
-              <a:t>  </a:t>
-            </a:r>
-            <a:endParaRPr lang="en-US" altLang="zh-CN" b="1" dirty="0" smtClean="0"/>
-          </a:p>
-          <a:p>
-            <a:r>
-              <a:rPr lang="en-US" altLang="zh-CN" dirty="0" smtClean="0"/>
-              <a:t>(</a:t>
-            </a:r>
-            <a:r>
-              <a:rPr lang="zh-CN" altLang="en-US" dirty="0" smtClean="0"/>
-              <a:t>镜像下载</a:t>
-            </a:r>
-            <a:r>
-              <a:rPr lang="en-US" altLang="zh-CN" dirty="0" smtClean="0"/>
-              <a:t>http</a:t>
-            </a:r>
-            <a:r>
-              <a:rPr lang="en-US" altLang="zh-CN" smtClean="0"/>
-              <a:t>://</a:t>
-            </a:r>
-            <a:r>
-              <a:rPr lang="en-US" altLang="zh-CN" smtClean="0"/>
-              <a:t>mirrors.zju.edu.cn/ubuntu-releases/16.04</a:t>
-            </a:r>
-            <a:r>
-              <a:rPr lang="en-US" altLang="zh-CN" dirty="0" smtClean="0"/>
-              <a:t>/)</a:t>
-            </a:r>
-            <a:endParaRPr lang="en-US" dirty="0" smtClean="0"/>
-          </a:p>
-          <a:p>
-            <a:endParaRPr lang="zh-CN" altLang="en-US" dirty="0"/>
-          </a:p>
-        </p:txBody>
-      </p:sp>
+      </p:pic>
+      <p:pic>
+        <p:nvPicPr>
+          <p:cNvPr id="5" name="Picture 3"/>
+          <p:cNvPicPr>
+            <a:picLocks noChangeAspect="1" noChangeArrowheads="1"/>
+          </p:cNvPicPr>
+          <p:nvPr/>
+        </p:nvPicPr>
+        <p:blipFill>
+          <a:blip r:embed="rId6"/>
+          <a:srcRect/>
+          <a:stretch>
+            <a:fillRect/>
+          </a:stretch>
+        </p:blipFill>
+        <p:spPr bwMode="auto">
+          <a:xfrm>
+            <a:off x="523837" y="3214686"/>
+            <a:ext cx="6572296" cy="1785950"/>
+          </a:xfrm>
+          <a:prstGeom prst="rect">
+            <a:avLst/>
+          </a:prstGeom>
+          <a:noFill/>
+          <a:ln w="9525">
+            <a:noFill/>
+            <a:miter lim="800000"/>
+            <a:headEnd/>
+            <a:tailEnd/>
+          </a:ln>
+          <a:effectLst/>
+        </p:spPr>
+      </p:pic>
     </p:spTree>
     <p:extLst>
       <p:ext uri="{BB962C8B-B14F-4D97-AF65-F5344CB8AC3E}">

</xml_diff>